<commit_message>
Data struct and Crypto modified
</commit_message>
<xml_diff>
--- a/Cryptography and Network Security_upload.pptx
+++ b/Cryptography and Network Security_upload.pptx
@@ -26,10 +26,11 @@
     <p:sldId id="279" r:id="rId20"/>
     <p:sldId id="280" r:id="rId21"/>
     <p:sldId id="281" r:id="rId22"/>
-    <p:sldId id="274" r:id="rId23"/>
-    <p:sldId id="275" r:id="rId24"/>
-    <p:sldId id="276" r:id="rId25"/>
-    <p:sldId id="273" r:id="rId26"/>
+    <p:sldId id="282" r:id="rId23"/>
+    <p:sldId id="274" r:id="rId24"/>
+    <p:sldId id="275" r:id="rId25"/>
+    <p:sldId id="276" r:id="rId26"/>
+    <p:sldId id="273" r:id="rId27"/>
   </p:sldIdLst>
   <p:sldSz cx="12192000" cy="6858000"/>
   <p:notesSz cx="6858000" cy="9144000"/>
@@ -283,7 +284,7 @@
           <a:p>
             <a:fld id="{D3FF76EF-8404-4DB1-8DC3-B3CC031CA162}" type="datetimeFigureOut">
               <a:rPr lang="ko-KR" altLang="en-US" smtClean="0"/>
-              <a:t>2024-04-08</a:t>
+              <a:t>2024-04-09</a:t>
             </a:fld>
             <a:endParaRPr lang="ko-KR" altLang="en-US"/>
           </a:p>
@@ -481,7 +482,7 @@
           <a:p>
             <a:fld id="{D3FF76EF-8404-4DB1-8DC3-B3CC031CA162}" type="datetimeFigureOut">
               <a:rPr lang="ko-KR" altLang="en-US" smtClean="0"/>
-              <a:t>2024-04-08</a:t>
+              <a:t>2024-04-09</a:t>
             </a:fld>
             <a:endParaRPr lang="ko-KR" altLang="en-US"/>
           </a:p>
@@ -689,7 +690,7 @@
           <a:p>
             <a:fld id="{D3FF76EF-8404-4DB1-8DC3-B3CC031CA162}" type="datetimeFigureOut">
               <a:rPr lang="ko-KR" altLang="en-US" smtClean="0"/>
-              <a:t>2024-04-08</a:t>
+              <a:t>2024-04-09</a:t>
             </a:fld>
             <a:endParaRPr lang="ko-KR" altLang="en-US"/>
           </a:p>
@@ -887,7 +888,7 @@
           <a:p>
             <a:fld id="{D3FF76EF-8404-4DB1-8DC3-B3CC031CA162}" type="datetimeFigureOut">
               <a:rPr lang="ko-KR" altLang="en-US" smtClean="0"/>
-              <a:t>2024-04-08</a:t>
+              <a:t>2024-04-09</a:t>
             </a:fld>
             <a:endParaRPr lang="ko-KR" altLang="en-US"/>
           </a:p>
@@ -1162,7 +1163,7 @@
           <a:p>
             <a:fld id="{D3FF76EF-8404-4DB1-8DC3-B3CC031CA162}" type="datetimeFigureOut">
               <a:rPr lang="ko-KR" altLang="en-US" smtClean="0"/>
-              <a:t>2024-04-08</a:t>
+              <a:t>2024-04-09</a:t>
             </a:fld>
             <a:endParaRPr lang="ko-KR" altLang="en-US"/>
           </a:p>
@@ -1427,7 +1428,7 @@
           <a:p>
             <a:fld id="{D3FF76EF-8404-4DB1-8DC3-B3CC031CA162}" type="datetimeFigureOut">
               <a:rPr lang="ko-KR" altLang="en-US" smtClean="0"/>
-              <a:t>2024-04-08</a:t>
+              <a:t>2024-04-09</a:t>
             </a:fld>
             <a:endParaRPr lang="ko-KR" altLang="en-US"/>
           </a:p>
@@ -1839,7 +1840,7 @@
           <a:p>
             <a:fld id="{D3FF76EF-8404-4DB1-8DC3-B3CC031CA162}" type="datetimeFigureOut">
               <a:rPr lang="ko-KR" altLang="en-US" smtClean="0"/>
-              <a:t>2024-04-08</a:t>
+              <a:t>2024-04-09</a:t>
             </a:fld>
             <a:endParaRPr lang="ko-KR" altLang="en-US"/>
           </a:p>
@@ -1980,7 +1981,7 @@
           <a:p>
             <a:fld id="{D3FF76EF-8404-4DB1-8DC3-B3CC031CA162}" type="datetimeFigureOut">
               <a:rPr lang="ko-KR" altLang="en-US" smtClean="0"/>
-              <a:t>2024-04-08</a:t>
+              <a:t>2024-04-09</a:t>
             </a:fld>
             <a:endParaRPr lang="ko-KR" altLang="en-US"/>
           </a:p>
@@ -2093,7 +2094,7 @@
           <a:p>
             <a:fld id="{D3FF76EF-8404-4DB1-8DC3-B3CC031CA162}" type="datetimeFigureOut">
               <a:rPr lang="ko-KR" altLang="en-US" smtClean="0"/>
-              <a:t>2024-04-08</a:t>
+              <a:t>2024-04-09</a:t>
             </a:fld>
             <a:endParaRPr lang="ko-KR" altLang="en-US"/>
           </a:p>
@@ -2404,7 +2405,7 @@
           <a:p>
             <a:fld id="{D3FF76EF-8404-4DB1-8DC3-B3CC031CA162}" type="datetimeFigureOut">
               <a:rPr lang="ko-KR" altLang="en-US" smtClean="0"/>
-              <a:t>2024-04-08</a:t>
+              <a:t>2024-04-09</a:t>
             </a:fld>
             <a:endParaRPr lang="ko-KR" altLang="en-US"/>
           </a:p>
@@ -2692,7 +2693,7 @@
           <a:p>
             <a:fld id="{D3FF76EF-8404-4DB1-8DC3-B3CC031CA162}" type="datetimeFigureOut">
               <a:rPr lang="ko-KR" altLang="en-US" smtClean="0"/>
-              <a:t>2024-04-08</a:t>
+              <a:t>2024-04-09</a:t>
             </a:fld>
             <a:endParaRPr lang="ko-KR" altLang="en-US"/>
           </a:p>
@@ -2933,7 +2934,7 @@
           <a:p>
             <a:fld id="{D3FF76EF-8404-4DB1-8DC3-B3CC031CA162}" type="datetimeFigureOut">
               <a:rPr lang="ko-KR" altLang="en-US" smtClean="0"/>
-              <a:t>2024-04-08</a:t>
+              <a:t>2024-04-09</a:t>
             </a:fld>
             <a:endParaRPr lang="ko-KR" altLang="en-US"/>
           </a:p>
@@ -4502,7 +4503,7 @@
         <p:spPr>
           <a:xfrm>
             <a:off x="267855" y="1533236"/>
-            <a:ext cx="11647054" cy="1477328"/>
+            <a:ext cx="11647054" cy="2031325"/>
           </a:xfrm>
           <a:prstGeom prst="rect">
             <a:avLst/>
@@ -4517,58 +4518,52 @@
           <a:p>
             <a:r>
               <a:rPr lang="ko-KR" altLang="en-US" dirty="0" err="1"/>
-              <a:t>배주</a:t>
-            </a:r>
-            <a:r>
-              <a:rPr lang="ko-KR" altLang="en-US" dirty="0"/>
-              <a:t> 계수의 사용 이유와</a:t>
-            </a:r>
-            <a:r>
-              <a:rPr lang="en-US" altLang="ko-KR" dirty="0"/>
-              <a:t>, s</a:t>
-            </a:r>
-            <a:r>
-              <a:rPr lang="ko-KR" altLang="en-US" dirty="0"/>
-              <a:t>와 </a:t>
-            </a:r>
-            <a:r>
-              <a:rPr lang="en-US" altLang="ko-KR" dirty="0"/>
-              <a:t>t</a:t>
-            </a:r>
-            <a:r>
-              <a:rPr lang="ko-KR" altLang="en-US" dirty="0"/>
-              <a:t>에 </a:t>
+              <a:t>점화식</a:t>
+            </a:r>
+            <a:r>
+              <a:rPr lang="ko-KR" altLang="en-US" dirty="0"/>
+              <a:t> </a:t>
+            </a:r>
+            <a:r>
+              <a:rPr lang="en-US" altLang="ko-KR" dirty="0"/>
+              <a:t>: </a:t>
+            </a:r>
+            <a:r>
+              <a:rPr lang="ko-KR" altLang="en-US" dirty="0"/>
+              <a:t>특정 수열에서 이웃하는 두 항 사이의 관계</a:t>
+            </a:r>
+            <a:r>
+              <a:rPr lang="en-US" altLang="ko-KR" dirty="0"/>
+              <a:t>. </a:t>
             </a:r>
             <a:r>
               <a:rPr lang="en-US" altLang="ko-KR" dirty="0" err="1"/>
-              <a:t>s0</a:t>
-            </a:r>
-            <a:r>
-              <a:rPr lang="en-US" altLang="ko-KR" dirty="0"/>
-              <a:t>, </a:t>
-            </a:r>
-            <a:r>
-              <a:rPr lang="en-US" altLang="ko-KR" dirty="0" err="1"/>
-              <a:t>t0</a:t>
-            </a:r>
-            <a:r>
-              <a:rPr lang="ko-KR" altLang="en-US" dirty="0"/>
-              <a:t>은 진행을 위해 넣은 것을 이해하면 됨</a:t>
+              <a:t>An+1</a:t>
+            </a:r>
+            <a:r>
+              <a:rPr lang="ko-KR" altLang="en-US" dirty="0"/>
+              <a:t>과 </a:t>
+            </a:r>
+            <a:r>
+              <a:rPr lang="en-US" altLang="ko-KR" dirty="0"/>
+              <a:t>An</a:t>
+            </a:r>
+            <a:r>
+              <a:rPr lang="ko-KR" altLang="en-US" dirty="0"/>
+              <a:t>사이의 관계식</a:t>
             </a:r>
             <a:endParaRPr lang="en-US" altLang="ko-KR" dirty="0"/>
           </a:p>
           <a:p>
-            <a:r>
-              <a:rPr lang="en-US" altLang="ko-KR" dirty="0"/>
-              <a:t>(</a:t>
-            </a:r>
-            <a:r>
-              <a:rPr lang="ko-KR" altLang="en-US" dirty="0"/>
-              <a:t>설명 보충 예정</a:t>
-            </a:r>
-            <a:r>
-              <a:rPr lang="en-US" altLang="ko-KR"/>
-              <a:t>)</a:t>
+            <a:endParaRPr lang="en-US" altLang="ko-KR" dirty="0"/>
+          </a:p>
+          <a:p>
+            <a:endParaRPr lang="en-US" altLang="ko-KR" dirty="0"/>
+          </a:p>
+          <a:p>
+            <a:r>
+              <a:rPr lang="ko-KR" altLang="en-US"/>
+              <a:t>여기는 좀 더 보완할 것</a:t>
             </a:r>
             <a:endParaRPr lang="en-US" altLang="ko-KR" dirty="0"/>
           </a:p>
@@ -8974,7 +8969,7 @@
               <a:t>집합이라는 게 이해가 안됨</a:t>
             </a:r>
             <a:r>
-              <a:rPr lang="en-US" altLang="ko-KR"/>
+              <a:rPr lang="en-US" altLang="ko-KR" dirty="0"/>
               <a:t>.  </a:t>
             </a:r>
             <a:endParaRPr lang="ko-KR" altLang="en-US" dirty="0"/>
@@ -9016,6 +9011,268 @@
           <p:cNvPr id="2" name="제목 1">
             <a:extLst>
               <a:ext uri="{FF2B5EF4-FFF2-40B4-BE49-F238E27FC236}">
+                <a16:creationId xmlns:a16="http://schemas.microsoft.com/office/drawing/2014/main" id="{D14CD948-1104-428B-BDFB-CFE5CB39A39E}"/>
+              </a:ext>
+            </a:extLst>
+          </p:cNvPr>
+          <p:cNvSpPr>
+            <a:spLocks noGrp="1"/>
+          </p:cNvSpPr>
+          <p:nvPr>
+            <p:ph type="title"/>
+          </p:nvPr>
+        </p:nvSpPr>
+        <p:spPr/>
+        <p:txBody>
+          <a:bodyPr/>
+          <a:lstStyle/>
+          <a:p>
+            <a:pPr algn="ctr"/>
+            <a:r>
+              <a:rPr lang="ko-KR" altLang="en-US" dirty="0" err="1"/>
+              <a:t>오일러</a:t>
+            </a:r>
+            <a:r>
+              <a:rPr lang="ko-KR" altLang="en-US" dirty="0"/>
+              <a:t> 정리</a:t>
+            </a:r>
+          </a:p>
+        </p:txBody>
+      </p:sp>
+      <p:sp>
+        <p:nvSpPr>
+          <p:cNvPr id="4" name="TextBox 3">
+            <a:extLst>
+              <a:ext uri="{FF2B5EF4-FFF2-40B4-BE49-F238E27FC236}">
+                <a16:creationId xmlns:a16="http://schemas.microsoft.com/office/drawing/2014/main" id="{D0B98657-3C42-2BDA-6601-9C02BD4B5D6A}"/>
+              </a:ext>
+            </a:extLst>
+          </p:cNvPr>
+          <p:cNvSpPr txBox="1"/>
+          <p:nvPr/>
+        </p:nvSpPr>
+        <p:spPr>
+          <a:xfrm>
+            <a:off x="526473" y="1810327"/>
+            <a:ext cx="11259127" cy="1754326"/>
+          </a:xfrm>
+          <a:prstGeom prst="rect">
+            <a:avLst/>
+          </a:prstGeom>
+          <a:noFill/>
+        </p:spPr>
+        <p:txBody>
+          <a:bodyPr wrap="square" rtlCol="0">
+            <a:spAutoFit/>
+          </a:bodyPr>
+          <a:lstStyle/>
+          <a:p>
+            <a:r>
+              <a:rPr lang="en-US" altLang="ko-KR" dirty="0"/>
+              <a:t>a</a:t>
+            </a:r>
+            <a:r>
+              <a:rPr lang="ko-KR" altLang="en-US" dirty="0"/>
+              <a:t>와 </a:t>
+            </a:r>
+            <a:r>
+              <a:rPr lang="en-US" altLang="ko-KR" dirty="0"/>
+              <a:t>n</a:t>
+            </a:r>
+            <a:r>
+              <a:rPr lang="ko-KR" altLang="en-US" dirty="0"/>
+              <a:t>이 서로소이지만</a:t>
+            </a:r>
+            <a:r>
+              <a:rPr lang="en-US" altLang="ko-KR" dirty="0"/>
+              <a:t>, n</a:t>
+            </a:r>
+            <a:r>
+              <a:rPr lang="ko-KR" altLang="en-US" dirty="0"/>
+              <a:t>이 소수가 아닐 경우</a:t>
+            </a:r>
+            <a:endParaRPr lang="en-US" altLang="ko-KR" dirty="0"/>
+          </a:p>
+          <a:p>
+            <a:endParaRPr lang="en-US" altLang="ko-KR" dirty="0"/>
+          </a:p>
+          <a:p>
+            <a:r>
+              <a:rPr lang="ko-KR" altLang="en-US" dirty="0"/>
+              <a:t>전부 다 비슷하지만</a:t>
+            </a:r>
+            <a:r>
+              <a:rPr lang="en-US" altLang="ko-KR" dirty="0"/>
+              <a:t>, </a:t>
+            </a:r>
+            <a:r>
+              <a:rPr lang="ko-KR" altLang="en-US" dirty="0"/>
+              <a:t>여기서 </a:t>
+            </a:r>
+            <a:r>
+              <a:rPr lang="ko-KR" altLang="en-US" dirty="0" err="1"/>
+              <a:t>서로소</a:t>
+            </a:r>
+            <a:r>
+              <a:rPr lang="ko-KR" altLang="en-US" dirty="0"/>
+              <a:t> </a:t>
+            </a:r>
+            <a:r>
+              <a:rPr lang="en-US" altLang="ko-KR" dirty="0"/>
+              <a:t>mod </a:t>
+            </a:r>
+            <a:r>
+              <a:rPr lang="ko-KR" altLang="en-US" dirty="0" err="1"/>
+              <a:t>서로소</a:t>
+            </a:r>
+            <a:r>
+              <a:rPr lang="ko-KR" altLang="en-US" dirty="0"/>
+              <a:t> </a:t>
+            </a:r>
+            <a:r>
+              <a:rPr lang="en-US" altLang="ko-KR" dirty="0"/>
+              <a:t>= </a:t>
+            </a:r>
+            <a:r>
+              <a:rPr lang="ko-KR" altLang="en-US" dirty="0"/>
+              <a:t>서로소라는 것이 깔려 있는 듯하다</a:t>
+            </a:r>
+            <a:r>
+              <a:rPr lang="en-US" altLang="ko-KR" dirty="0"/>
+              <a:t>.</a:t>
+            </a:r>
+          </a:p>
+          <a:p>
+            <a:endParaRPr lang="en-US" altLang="ko-KR" dirty="0"/>
+          </a:p>
+          <a:p>
+            <a:r>
+              <a:rPr lang="ko-KR" altLang="en-US" dirty="0"/>
+              <a:t>따라서</a:t>
+            </a:r>
+            <a:r>
+              <a:rPr lang="en-US" altLang="ko-KR" dirty="0"/>
+              <a:t>, ax mod n [</a:t>
+            </a:r>
+            <a:r>
+              <a:rPr lang="ko-KR" altLang="en-US" dirty="0" err="1"/>
+              <a:t>서로소</a:t>
+            </a:r>
+            <a:r>
+              <a:rPr lang="ko-KR" altLang="en-US" dirty="0"/>
+              <a:t> </a:t>
+            </a:r>
+            <a:r>
+              <a:rPr lang="en-US" altLang="ko-KR" dirty="0"/>
+              <a:t>mod </a:t>
+            </a:r>
+            <a:r>
+              <a:rPr lang="ko-KR" altLang="en-US" dirty="0" err="1"/>
+              <a:t>서로소</a:t>
+            </a:r>
+            <a:r>
+              <a:rPr lang="en-US" altLang="ko-KR" dirty="0"/>
+              <a:t>]</a:t>
+            </a:r>
+            <a:r>
+              <a:rPr lang="ko-KR" altLang="en-US" dirty="0"/>
+              <a:t>의 개수가 </a:t>
+            </a:r>
+            <a:r>
+              <a:rPr lang="en-US" altLang="ko-KR" dirty="0"/>
+              <a:t>x</a:t>
+            </a:r>
+            <a:r>
+              <a:rPr lang="ko-KR" altLang="en-US" dirty="0"/>
+              <a:t>의 집합과 같고</a:t>
+            </a:r>
+            <a:r>
+              <a:rPr lang="en-US" altLang="ko-KR" dirty="0"/>
+              <a:t>, ax mod n</a:t>
+            </a:r>
+            <a:r>
+              <a:rPr lang="ko-KR" altLang="en-US" dirty="0"/>
+              <a:t>들은 같을 수 없다는 조건과 합친다면</a:t>
+            </a:r>
+            <a:r>
+              <a:rPr lang="en-US" altLang="ko-KR" dirty="0"/>
+              <a:t>, n</a:t>
+            </a:r>
+            <a:r>
+              <a:rPr lang="ko-KR" altLang="en-US" dirty="0"/>
+              <a:t>보다 작지만 서로소인 모든 경우와 같을 수 밖에 없다</a:t>
+            </a:r>
+            <a:r>
+              <a:rPr lang="en-US" altLang="ko-KR" dirty="0"/>
+              <a:t>(</a:t>
+            </a:r>
+            <a:r>
+              <a:rPr lang="ko-KR" altLang="en-US" dirty="0"/>
+              <a:t>개수</a:t>
+            </a:r>
+            <a:r>
+              <a:rPr lang="en-US" altLang="ko-KR" dirty="0"/>
+              <a:t>, </a:t>
+            </a:r>
+            <a:r>
+              <a:rPr lang="ko-KR" altLang="en-US" dirty="0"/>
+              <a:t>각자 다름</a:t>
+            </a:r>
+            <a:r>
+              <a:rPr lang="en-US" altLang="ko-KR" dirty="0"/>
+              <a:t>, </a:t>
+            </a:r>
+            <a:r>
+              <a:rPr lang="ko-KR" altLang="en-US" dirty="0" err="1"/>
+              <a:t>서로소</a:t>
+            </a:r>
+            <a:r>
+              <a:rPr lang="en-US" altLang="ko-KR"/>
+              <a:t>)</a:t>
+            </a:r>
+            <a:r>
+              <a:rPr lang="ko-KR" altLang="en-US"/>
+              <a:t> </a:t>
+            </a:r>
+            <a:endParaRPr lang="ko-KR" altLang="en-US" dirty="0"/>
+          </a:p>
+        </p:txBody>
+      </p:sp>
+    </p:spTree>
+    <p:extLst>
+      <p:ext uri="{BB962C8B-B14F-4D97-AF65-F5344CB8AC3E}">
+        <p14:creationId xmlns:p14="http://schemas.microsoft.com/office/powerpoint/2010/main" val="2879203895"/>
+      </p:ext>
+    </p:extLst>
+  </p:cSld>
+  <p:clrMapOvr>
+    <a:masterClrMapping/>
+  </p:clrMapOvr>
+</p:sld>
+</file>
+
+<file path=ppt/slides/slide23.xml><?xml version="1.0" encoding="utf-8"?>
+<p:sld xmlns:a="http://schemas.openxmlformats.org/drawingml/2006/main" xmlns:r="http://schemas.openxmlformats.org/officeDocument/2006/relationships" xmlns:p="http://schemas.openxmlformats.org/presentationml/2006/main">
+  <p:cSld>
+    <p:spTree>
+      <p:nvGrpSpPr>
+        <p:cNvPr id="1" name=""/>
+        <p:cNvGrpSpPr/>
+        <p:nvPr/>
+      </p:nvGrpSpPr>
+      <p:grpSpPr>
+        <a:xfrm>
+          <a:off x="0" y="0"/>
+          <a:ext cx="0" cy="0"/>
+          <a:chOff x="0" y="0"/>
+          <a:chExt cx="0" cy="0"/>
+        </a:xfrm>
+      </p:grpSpPr>
+      <p:sp>
+        <p:nvSpPr>
+          <p:cNvPr id="2" name="제목 1">
+            <a:extLst>
+              <a:ext uri="{FF2B5EF4-FFF2-40B4-BE49-F238E27FC236}">
                 <a16:creationId xmlns:a16="http://schemas.microsoft.com/office/drawing/2014/main" id="{2B2C82B9-6380-9EF4-E4F4-2EAFC255E3FE}"/>
               </a:ext>
             </a:extLst>
@@ -9279,7 +9536,7 @@
 </p:sld>
 </file>
 
-<file path=ppt/slides/slide23.xml><?xml version="1.0" encoding="utf-8"?>
+<file path=ppt/slides/slide24.xml><?xml version="1.0" encoding="utf-8"?>
 <p:sld xmlns:a="http://schemas.openxmlformats.org/drawingml/2006/main" xmlns:r="http://schemas.openxmlformats.org/officeDocument/2006/relationships" xmlns:p="http://schemas.openxmlformats.org/presentationml/2006/main">
   <p:cSld>
     <p:spTree>
@@ -9761,7 +10018,7 @@
 </p:sld>
 </file>
 
-<file path=ppt/slides/slide24.xml><?xml version="1.0" encoding="utf-8"?>
+<file path=ppt/slides/slide25.xml><?xml version="1.0" encoding="utf-8"?>
 <p:sld xmlns:a="http://schemas.openxmlformats.org/drawingml/2006/main" xmlns:r="http://schemas.openxmlformats.org/officeDocument/2006/relationships" xmlns:p="http://schemas.openxmlformats.org/presentationml/2006/main">
   <p:cSld>
     <p:spTree>
@@ -10188,7 +10445,7 @@
 </p:sld>
 </file>
 
-<file path=ppt/slides/slide25.xml><?xml version="1.0" encoding="utf-8"?>
+<file path=ppt/slides/slide26.xml><?xml version="1.0" encoding="utf-8"?>
 <p:sld xmlns:a="http://schemas.openxmlformats.org/drawingml/2006/main" xmlns:r="http://schemas.openxmlformats.org/officeDocument/2006/relationships" xmlns:p="http://schemas.openxmlformats.org/presentationml/2006/main">
   <p:cSld>
     <p:spTree>

</xml_diff>